<commit_message>
Made game over logic
</commit_message>
<xml_diff>
--- a/FinalDeliverables_doc/bc160401965.pptx
+++ b/FinalDeliverables_doc/bc160401965.pptx
@@ -9289,7 +9289,7 @@
         </p:blipFill>
         <p:spPr>
           <a:xfrm>
-            <a:off x="311700" y="293275"/>
+            <a:off x="3788063" y="304575"/>
             <a:ext cx="1567875" cy="1567875"/>
           </a:xfrm>
           <a:prstGeom prst="rect">
@@ -9491,8 +9491,8 @@
         </p:blipFill>
         <p:spPr>
           <a:xfrm>
-            <a:off x="3476163" y="998325"/>
-            <a:ext cx="2191674" cy="3865951"/>
+            <a:off x="3486513" y="1048950"/>
+            <a:ext cx="2170969" cy="3865950"/>
           </a:xfrm>
           <a:prstGeom prst="rect">
             <a:avLst/>

</xml_diff>